<commit_message>
Updated preentation and individual report
</commit_message>
<xml_diff>
--- a/Final-Group-Presentation/Final-Project-Group3-Presentation.pptx
+++ b/Final-Group-Presentation/Final-Project-Group3-Presentation.pptx
@@ -13351,8 +13351,8 @@
         </p:blipFill>
         <p:spPr>
           <a:xfrm>
-            <a:off x="1778400" y="170463"/>
-            <a:ext cx="8305400" cy="6517074"/>
+            <a:off x="1693333" y="103712"/>
+            <a:ext cx="8827911" cy="6705623"/>
           </a:xfrm>
         </p:spPr>
       </p:pic>
@@ -14341,7 +14341,7 @@
         </p:blipFill>
         <p:spPr>
           <a:xfrm>
-            <a:off x="4280611" y="3500758"/>
+            <a:off x="4835075" y="3415440"/>
             <a:ext cx="2032000" cy="1543050"/>
           </a:xfrm>
           <a:prstGeom prst="rect">
@@ -14363,7 +14363,7 @@
         </p:nvSpPr>
         <p:spPr>
           <a:xfrm>
-            <a:off x="4794642" y="5037862"/>
+            <a:off x="5349106" y="4952544"/>
             <a:ext cx="1393330" cy="369332"/>
           </a:xfrm>
           <a:prstGeom prst="rect">
@@ -14471,7 +14471,7 @@
         </p:blipFill>
         <p:spPr>
           <a:xfrm>
-            <a:off x="7519875" y="3500758"/>
+            <a:off x="8313554" y="3429000"/>
             <a:ext cx="2032000" cy="1543050"/>
           </a:xfrm>
           <a:prstGeom prst="rect">
@@ -14493,7 +14493,7 @@
         </p:nvSpPr>
         <p:spPr>
           <a:xfrm>
-            <a:off x="7469842" y="5044817"/>
+            <a:off x="8263521" y="4973059"/>
             <a:ext cx="2238113" cy="369332"/>
           </a:xfrm>
           <a:prstGeom prst="rect">

</xml_diff>